<commit_message>
Add 8 and 7/ upd 6 task
</commit_message>
<xml_diff>
--- a/Java Урок 2 БО.pptx
+++ b/Java Урок 2 БО.pptx
@@ -270,7 +270,7 @@
           <a:p>
             <a:fld id="{58E66397-81EA-4CFE-ABE0-DFAF6EB92EF1}" type="datetimeFigureOut">
               <a:rPr lang="uk-UA" smtClean="0"/>
-              <a:t>26.10.2023</a:t>
+              <a:t>01.11.2023</a:t>
             </a:fld>
             <a:endParaRPr lang="uk-UA"/>
           </a:p>
@@ -470,7 +470,7 @@
           <a:p>
             <a:fld id="{58E66397-81EA-4CFE-ABE0-DFAF6EB92EF1}" type="datetimeFigureOut">
               <a:rPr lang="uk-UA" smtClean="0"/>
-              <a:t>26.10.2023</a:t>
+              <a:t>01.11.2023</a:t>
             </a:fld>
             <a:endParaRPr lang="uk-UA"/>
           </a:p>
@@ -680,7 +680,7 @@
           <a:p>
             <a:fld id="{58E66397-81EA-4CFE-ABE0-DFAF6EB92EF1}" type="datetimeFigureOut">
               <a:rPr lang="uk-UA" smtClean="0"/>
-              <a:t>26.10.2023</a:t>
+              <a:t>01.11.2023</a:t>
             </a:fld>
             <a:endParaRPr lang="uk-UA"/>
           </a:p>
@@ -880,7 +880,7 @@
           <a:p>
             <a:fld id="{58E66397-81EA-4CFE-ABE0-DFAF6EB92EF1}" type="datetimeFigureOut">
               <a:rPr lang="uk-UA" smtClean="0"/>
-              <a:t>26.10.2023</a:t>
+              <a:t>01.11.2023</a:t>
             </a:fld>
             <a:endParaRPr lang="uk-UA"/>
           </a:p>
@@ -1156,7 +1156,7 @@
           <a:p>
             <a:fld id="{58E66397-81EA-4CFE-ABE0-DFAF6EB92EF1}" type="datetimeFigureOut">
               <a:rPr lang="uk-UA" smtClean="0"/>
-              <a:t>26.10.2023</a:t>
+              <a:t>01.11.2023</a:t>
             </a:fld>
             <a:endParaRPr lang="uk-UA"/>
           </a:p>
@@ -1424,7 +1424,7 @@
           <a:p>
             <a:fld id="{58E66397-81EA-4CFE-ABE0-DFAF6EB92EF1}" type="datetimeFigureOut">
               <a:rPr lang="uk-UA" smtClean="0"/>
-              <a:t>26.10.2023</a:t>
+              <a:t>01.11.2023</a:t>
             </a:fld>
             <a:endParaRPr lang="uk-UA"/>
           </a:p>
@@ -1839,7 +1839,7 @@
           <a:p>
             <a:fld id="{58E66397-81EA-4CFE-ABE0-DFAF6EB92EF1}" type="datetimeFigureOut">
               <a:rPr lang="uk-UA" smtClean="0"/>
-              <a:t>26.10.2023</a:t>
+              <a:t>01.11.2023</a:t>
             </a:fld>
             <a:endParaRPr lang="uk-UA"/>
           </a:p>
@@ -1981,7 +1981,7 @@
           <a:p>
             <a:fld id="{58E66397-81EA-4CFE-ABE0-DFAF6EB92EF1}" type="datetimeFigureOut">
               <a:rPr lang="uk-UA" smtClean="0"/>
-              <a:t>26.10.2023</a:t>
+              <a:t>01.11.2023</a:t>
             </a:fld>
             <a:endParaRPr lang="uk-UA"/>
           </a:p>
@@ -2094,7 +2094,7 @@
           <a:p>
             <a:fld id="{58E66397-81EA-4CFE-ABE0-DFAF6EB92EF1}" type="datetimeFigureOut">
               <a:rPr lang="uk-UA" smtClean="0"/>
-              <a:t>26.10.2023</a:t>
+              <a:t>01.11.2023</a:t>
             </a:fld>
             <a:endParaRPr lang="uk-UA"/>
           </a:p>
@@ -2407,7 +2407,7 @@
           <a:p>
             <a:fld id="{58E66397-81EA-4CFE-ABE0-DFAF6EB92EF1}" type="datetimeFigureOut">
               <a:rPr lang="uk-UA" smtClean="0"/>
-              <a:t>26.10.2023</a:t>
+              <a:t>01.11.2023</a:t>
             </a:fld>
             <a:endParaRPr lang="uk-UA"/>
           </a:p>
@@ -2696,7 +2696,7 @@
           <a:p>
             <a:fld id="{58E66397-81EA-4CFE-ABE0-DFAF6EB92EF1}" type="datetimeFigureOut">
               <a:rPr lang="uk-UA" smtClean="0"/>
-              <a:t>26.10.2023</a:t>
+              <a:t>01.11.2023</a:t>
             </a:fld>
             <a:endParaRPr lang="uk-UA"/>
           </a:p>
@@ -2939,7 +2939,7 @@
           <a:p>
             <a:fld id="{58E66397-81EA-4CFE-ABE0-DFAF6EB92EF1}" type="datetimeFigureOut">
               <a:rPr lang="uk-UA" smtClean="0"/>
-              <a:t>26.10.2023</a:t>
+              <a:t>01.11.2023</a:t>
             </a:fld>
             <a:endParaRPr lang="uk-UA"/>
           </a:p>
@@ -4857,7 +4857,7 @@
         </p:nvSpPr>
         <p:spPr>
           <a:xfrm>
-            <a:off x="763570" y="1254283"/>
+            <a:off x="730576" y="1254283"/>
             <a:ext cx="5109328" cy="5047536"/>
           </a:xfrm>
           <a:prstGeom prst="rect">

</xml_diff>